<commit_message>
made changes to the ppt, added in a requirements.txt.
</commit_message>
<xml_diff>
--- a/MLP/Lesson 1_ MLP.pptx
+++ b/MLP/Lesson 1_ MLP.pptx
@@ -1888,7 +1888,7 @@
         </p:nvSpPr>
         <p:spPr>
           <a:xfrm>
-            <a:off x="381300" y="685800"/>
+            <a:off x="381000" y="685800"/>
             <a:ext cx="6096000" cy="3429000"/>
           </a:xfrm>
           <a:custGeom>
@@ -1951,7 +1951,13 @@
               </a:spcAft>
               <a:buNone/>
             </a:pPr>
-            <a:endParaRPr/>
+            <a:r>
+              <a:rPr lang="en-SG">
+                <a:hlinkClick r:id="rId3"/>
+              </a:rPr>
+              <a:t>https://medium.com/octavian-ai/which-optimizer-and-learning-rate-should-i-use-for-deep-learning-5acb418f9b2</a:t>
+            </a:r>
+            <a:endParaRPr dirty="0"/>
           </a:p>
         </p:txBody>
       </p:sp>

</xml_diff>